<commit_message>
File update Nov 14
</commit_message>
<xml_diff>
--- a/misc/WAVES tempalte.pptx
+++ b/misc/WAVES tempalte.pptx
@@ -6,11 +6,12 @@
   </p:sldMasterIdLst>
   <p:sldIdLst>
     <p:sldId id="256" r:id="rId2"/>
-    <p:sldId id="257" r:id="rId3"/>
-    <p:sldId id="258" r:id="rId4"/>
-    <p:sldId id="259" r:id="rId5"/>
-    <p:sldId id="260" r:id="rId6"/>
-    <p:sldId id="261" r:id="rId7"/>
+    <p:sldId id="262" r:id="rId3"/>
+    <p:sldId id="257" r:id="rId4"/>
+    <p:sldId id="258" r:id="rId5"/>
+    <p:sldId id="259" r:id="rId6"/>
+    <p:sldId id="260" r:id="rId7"/>
+    <p:sldId id="261" r:id="rId8"/>
   </p:sldIdLst>
   <p:sldSz cx="12192000" cy="6858000"/>
   <p:notesSz cx="6858000" cy="9144000"/>
@@ -25689,6 +25690,34 @@
 <file path=ppt/slides/slide1.xml><?xml version="1.0" encoding="utf-8"?>
 <p:sld xmlns:a="http://schemas.openxmlformats.org/drawingml/2006/main" xmlns:r="http://schemas.openxmlformats.org/officeDocument/2006/relationships" xmlns:p="http://schemas.openxmlformats.org/presentationml/2006/main">
   <p:cSld>
+    <p:bg>
+      <p:bgPr>
+        <a:gradFill>
+          <a:gsLst>
+            <a:gs pos="0">
+              <a:schemeClr val="accent1">
+                <a:lumMod val="5000"/>
+                <a:lumOff val="95000"/>
+              </a:schemeClr>
+            </a:gs>
+            <a:gs pos="39000">
+              <a:srgbClr val="0070C0"/>
+            </a:gs>
+            <a:gs pos="83000">
+              <a:schemeClr val="accent1">
+                <a:lumMod val="45000"/>
+                <a:lumOff val="55000"/>
+              </a:schemeClr>
+            </a:gs>
+            <a:gs pos="100000">
+              <a:schemeClr val="accent4"/>
+            </a:gs>
+          </a:gsLst>
+          <a:lin ang="5400000" scaled="1"/>
+        </a:gradFill>
+        <a:effectLst/>
+      </p:bgPr>
+    </p:bg>
     <p:spTree>
       <p:nvGrpSpPr>
         <p:cNvPr id="1" name=""/>
@@ -25721,13 +25750,13 @@
         </p:nvSpPr>
         <p:spPr>
           <a:xfrm>
-            <a:off x="2066925" y="1131888"/>
-            <a:ext cx="8058149" cy="2697162"/>
+            <a:off x="1474097" y="1131888"/>
+            <a:ext cx="9243804" cy="2697162"/>
           </a:xfrm>
         </p:spPr>
         <p:txBody>
           <a:bodyPr>
-            <a:normAutofit fontScale="90000"/>
+            <a:normAutofit/>
           </a:bodyPr>
           <a:lstStyle/>
           <a:p>
@@ -25740,7 +25769,14 @@
             </a:br>
             <a:r>
               <a:rPr lang="en-US" dirty="0"/>
-              <a:t>(Wavelength*Amplitude)/(</a:t>
+              <a:t>(Wavelength*Amplitude)/</a:t>
+            </a:r>
+            <a:br>
+              <a:rPr lang="en-US" dirty="0"/>
+            </a:br>
+            <a:r>
+              <a:rPr lang="en-US" dirty="0"/>
+              <a:t>(</a:t>
             </a:r>
             <a:r>
               <a:rPr lang="en-US" dirty="0" err="1"/>
@@ -25812,6 +25848,70 @@
 </file>
 
 <file path=ppt/slides/slide2.xml><?xml version="1.0" encoding="utf-8"?>
+<p:sld xmlns:a="http://schemas.openxmlformats.org/drawingml/2006/main" xmlns:r="http://schemas.openxmlformats.org/officeDocument/2006/relationships" xmlns:p="http://schemas.openxmlformats.org/presentationml/2006/main">
+  <p:cSld>
+    <p:bg>
+      <p:bgPr>
+        <a:gradFill>
+          <a:gsLst>
+            <a:gs pos="0">
+              <a:schemeClr val="accent1">
+                <a:lumMod val="5000"/>
+                <a:lumOff val="95000"/>
+              </a:schemeClr>
+            </a:gs>
+            <a:gs pos="39000">
+              <a:srgbClr val="0070C0"/>
+            </a:gs>
+            <a:gs pos="83000">
+              <a:schemeClr val="accent1">
+                <a:lumMod val="45000"/>
+                <a:lumOff val="55000"/>
+              </a:schemeClr>
+            </a:gs>
+            <a:gs pos="100000">
+              <a:schemeClr val="accent4"/>
+            </a:gs>
+          </a:gsLst>
+          <a:lin ang="5400000" scaled="1"/>
+        </a:gradFill>
+        <a:effectLst/>
+      </p:bgPr>
+    </p:bg>
+    <p:spTree>
+      <p:nvGrpSpPr>
+        <p:cNvPr id="1" name="">
+          <a:extLst>
+            <a:ext uri="{FF2B5EF4-FFF2-40B4-BE49-F238E27FC236}">
+              <a16:creationId xmlns:a16="http://schemas.microsoft.com/office/drawing/2014/main" id="{09E0D420-A11A-F230-D401-BF64F452B7CA}"/>
+            </a:ext>
+          </a:extLst>
+        </p:cNvPr>
+        <p:cNvGrpSpPr/>
+        <p:nvPr/>
+      </p:nvGrpSpPr>
+      <p:grpSpPr>
+        <a:xfrm>
+          <a:off x="0" y="0"/>
+          <a:ext cx="0" cy="0"/>
+          <a:chOff x="0" y="0"/>
+          <a:chExt cx="0" cy="0"/>
+        </a:xfrm>
+      </p:grpSpPr>
+    </p:spTree>
+    <p:extLst>
+      <p:ext uri="{BB962C8B-B14F-4D97-AF65-F5344CB8AC3E}">
+        <p14:creationId xmlns:p14="http://schemas.microsoft.com/office/powerpoint/2010/main" val="3442561544"/>
+      </p:ext>
+    </p:extLst>
+  </p:cSld>
+  <p:clrMapOvr>
+    <a:masterClrMapping/>
+  </p:clrMapOvr>
+</p:sld>
+</file>
+
+<file path=ppt/slides/slide3.xml><?xml version="1.0" encoding="utf-8"?>
 <p:sld xmlns:a="http://schemas.openxmlformats.org/drawingml/2006/main" xmlns:r="http://schemas.openxmlformats.org/officeDocument/2006/relationships" xmlns:p="http://schemas.openxmlformats.org/presentationml/2006/main">
   <p:cSld>
     <p:spTree>
@@ -26752,7 +26852,7 @@
 </p:sld>
 </file>
 
-<file path=ppt/slides/slide3.xml><?xml version="1.0" encoding="utf-8"?>
+<file path=ppt/slides/slide4.xml><?xml version="1.0" encoding="utf-8"?>
 <p:sld xmlns:a="http://schemas.openxmlformats.org/drawingml/2006/main" xmlns:r="http://schemas.openxmlformats.org/officeDocument/2006/relationships" xmlns:p="http://schemas.openxmlformats.org/presentationml/2006/main">
   <p:cSld>
     <p:spTree>
@@ -26954,7 +27054,7 @@
 </p:sld>
 </file>
 
-<file path=ppt/slides/slide4.xml><?xml version="1.0" encoding="utf-8"?>
+<file path=ppt/slides/slide5.xml><?xml version="1.0" encoding="utf-8"?>
 <p:sld xmlns:a="http://schemas.openxmlformats.org/drawingml/2006/main" xmlns:r="http://schemas.openxmlformats.org/officeDocument/2006/relationships" xmlns:p="http://schemas.openxmlformats.org/presentationml/2006/main">
   <p:cSld>
     <p:spTree>
@@ -27872,7 +27972,7 @@
 </p:sld>
 </file>
 
-<file path=ppt/slides/slide5.xml><?xml version="1.0" encoding="utf-8"?>
+<file path=ppt/slides/slide6.xml><?xml version="1.0" encoding="utf-8"?>
 <p:sld xmlns:a="http://schemas.openxmlformats.org/drawingml/2006/main" xmlns:r="http://schemas.openxmlformats.org/officeDocument/2006/relationships" xmlns:p="http://schemas.openxmlformats.org/presentationml/2006/main">
   <p:cSld>
     <p:spTree>
@@ -28033,7 +28133,7 @@
 </p:sld>
 </file>
 
-<file path=ppt/slides/slide6.xml><?xml version="1.0" encoding="utf-8"?>
+<file path=ppt/slides/slide7.xml><?xml version="1.0" encoding="utf-8"?>
 <p:sld xmlns:a="http://schemas.openxmlformats.org/drawingml/2006/main" xmlns:r="http://schemas.openxmlformats.org/officeDocument/2006/relationships" xmlns:p="http://schemas.openxmlformats.org/presentationml/2006/main">
   <p:cSld>
     <p:spTree>

</xml_diff>